<commit_message>
The problem is channel diffence of BiFPN_outputs. The channel is must be same for being one tensor. I must figure out about the anchor's number in original code
</commit_message>
<xml_diff>
--- a/Yet-Another-EfficientDet-Pytorch-master/Structure.pptx
+++ b/Yet-Another-EfficientDet-Pytorch-master/Structure.pptx
@@ -6,7 +6,9 @@
   </p:sldMasterIdLst>
   <p:sldIdLst>
     <p:sldId id="257" r:id="rId2"/>
-    <p:sldId id="258" r:id="rId3"/>
+    <p:sldId id="259" r:id="rId3"/>
+    <p:sldId id="258" r:id="rId4"/>
+    <p:sldId id="260" r:id="rId5"/>
   </p:sldIdLst>
   <p:sldSz cx="12192000" cy="6858000"/>
   <p:notesSz cx="6858000" cy="9144000"/>
@@ -105,6 +107,11 @@
       </a:defRPr>
     </a:lvl9pPr>
   </p:defaultTextStyle>
+  <p:extLst>
+    <p:ext uri="{EFAFB233-063F-42B5-8137-9DF3F51BA10A}">
+      <p15:sldGuideLst xmlns:p15="http://schemas.microsoft.com/office/powerpoint/2012/main"/>
+    </p:ext>
+  </p:extLst>
 </p:presentation>
 </file>
 
@@ -3482,8 +3489,8 @@
         </p:nvSpPr>
         <p:spPr>
           <a:xfrm>
-            <a:off x="481495" y="1289878"/>
-            <a:ext cx="2274957" cy="693530"/>
+            <a:off x="4174922" y="343949"/>
+            <a:ext cx="3842157" cy="1145097"/>
           </a:xfrm>
           <a:prstGeom prst="rect">
             <a:avLst/>
@@ -3511,16 +3518,48 @@
           <a:p>
             <a:pPr algn="ctr"/>
             <a:r>
+              <a:rPr lang="ko-KR" altLang="en-US" dirty="0" smtClean="0"/>
+              <a:t>각 </a:t>
+            </a:r>
+            <a:r>
               <a:rPr lang="en-US" altLang="ko-KR" dirty="0" smtClean="0"/>
-              <a:t>FPN </a:t>
+              <a:t>Bounding box</a:t>
             </a:r>
             <a:r>
               <a:rPr lang="ko-KR" altLang="en-US" dirty="0" smtClean="0"/>
-              <a:t>사용 </a:t>
-            </a:r>
+              <a:t>를</a:t>
+            </a:r>
+            <a:endParaRPr lang="en-US" altLang="ko-KR" dirty="0" smtClean="0"/>
+          </a:p>
+          <a:p>
+            <a:pPr algn="ctr"/>
             <a:r>
               <a:rPr lang="en-US" altLang="ko-KR" dirty="0" smtClean="0"/>
-              <a:t>X</a:t>
+              <a:t>Feature map</a:t>
+            </a:r>
+            <a:r>
+              <a:rPr lang="ko-KR" altLang="en-US" dirty="0" smtClean="0"/>
+              <a:t>과 </a:t>
+            </a:r>
+            <a:r>
+              <a:rPr lang="en-US" altLang="ko-KR" dirty="0" smtClean="0"/>
+              <a:t>Image</a:t>
+            </a:r>
+            <a:r>
+              <a:rPr lang="ko-KR" altLang="en-US" dirty="0" smtClean="0"/>
+              <a:t>사이의 비율로</a:t>
+            </a:r>
+            <a:endParaRPr lang="en-US" altLang="ko-KR" dirty="0" smtClean="0"/>
+          </a:p>
+          <a:p>
+            <a:pPr algn="ctr"/>
+            <a:r>
+              <a:rPr lang="ko-KR" altLang="en-US" dirty="0" smtClean="0"/>
+              <a:t>나눈다</a:t>
+            </a:r>
+            <a:r>
+              <a:rPr lang="en-US" altLang="ko-KR" dirty="0" smtClean="0"/>
+              <a:t>.</a:t>
             </a:r>
             <a:endParaRPr lang="ko-KR" altLang="en-US" dirty="0"/>
           </a:p>
@@ -3534,8 +3573,8 @@
         </p:nvSpPr>
         <p:spPr>
           <a:xfrm>
-            <a:off x="481495" y="2449444"/>
-            <a:ext cx="2274957" cy="693530"/>
+            <a:off x="4174921" y="1960228"/>
+            <a:ext cx="3842157" cy="1145097"/>
           </a:xfrm>
           <a:prstGeom prst="rect">
             <a:avLst/>
@@ -3563,6 +3602,172 @@
           <a:p>
             <a:pPr algn="ctr"/>
             <a:r>
+              <a:rPr lang="ko-KR" altLang="en-US" dirty="0" smtClean="0"/>
+              <a:t>각 </a:t>
+            </a:r>
+            <a:r>
+              <a:rPr lang="en-US" altLang="ko-KR" dirty="0" smtClean="0"/>
+              <a:t>Bounding box</a:t>
+            </a:r>
+            <a:r>
+              <a:rPr lang="ko-KR" altLang="en-US" dirty="0" smtClean="0"/>
+              <a:t>를</a:t>
+            </a:r>
+            <a:endParaRPr lang="en-US" altLang="ko-KR" dirty="0" smtClean="0"/>
+          </a:p>
+          <a:p>
+            <a:pPr algn="ctr"/>
+            <a:r>
+              <a:rPr lang="en-US" altLang="ko-KR" dirty="0" smtClean="0"/>
+              <a:t>Feature map</a:t>
+            </a:r>
+            <a:r>
+              <a:rPr lang="ko-KR" altLang="en-US" dirty="0" smtClean="0"/>
+              <a:t>과 </a:t>
+            </a:r>
+            <a:r>
+              <a:rPr lang="en-US" altLang="ko-KR" dirty="0" smtClean="0"/>
+              <a:t>Image</a:t>
+            </a:r>
+            <a:r>
+              <a:rPr lang="ko-KR" altLang="en-US" dirty="0" smtClean="0"/>
+              <a:t>사이의 비율로</a:t>
+            </a:r>
+            <a:endParaRPr lang="en-US" altLang="ko-KR" dirty="0" smtClean="0"/>
+          </a:p>
+          <a:p>
+            <a:pPr algn="ctr"/>
+            <a:r>
+              <a:rPr lang="ko-KR" altLang="en-US" dirty="0" smtClean="0"/>
+              <a:t>나눈다</a:t>
+            </a:r>
+            <a:r>
+              <a:rPr lang="en-US" altLang="ko-KR" dirty="0" smtClean="0"/>
+              <a:t>.</a:t>
+            </a:r>
+            <a:endParaRPr lang="ko-KR" altLang="en-US" dirty="0"/>
+          </a:p>
+        </p:txBody>
+      </p:sp>
+    </p:spTree>
+    <p:extLst>
+      <p:ext uri="{BB962C8B-B14F-4D97-AF65-F5344CB8AC3E}">
+        <p14:creationId xmlns:p14="http://schemas.microsoft.com/office/powerpoint/2010/main" val="1190203972"/>
+      </p:ext>
+    </p:extLst>
+  </p:cSld>
+  <p:clrMapOvr>
+    <a:masterClrMapping/>
+  </p:clrMapOvr>
+</p:sld>
+</file>
+
+<file path=ppt/slides/slide3.xml><?xml version="1.0" encoding="utf-8"?>
+<p:sld xmlns:a="http://schemas.openxmlformats.org/drawingml/2006/main" xmlns:r="http://schemas.openxmlformats.org/officeDocument/2006/relationships" xmlns:p="http://schemas.openxmlformats.org/presentationml/2006/main">
+  <p:cSld>
+    <p:spTree>
+      <p:nvGrpSpPr>
+        <p:cNvPr id="1" name=""/>
+        <p:cNvGrpSpPr/>
+        <p:nvPr/>
+      </p:nvGrpSpPr>
+      <p:grpSpPr>
+        <a:xfrm>
+          <a:off x="0" y="0"/>
+          <a:ext cx="0" cy="0"/>
+          <a:chOff x="0" y="0"/>
+          <a:chExt cx="0" cy="0"/>
+        </a:xfrm>
+      </p:grpSpPr>
+      <p:sp>
+        <p:nvSpPr>
+          <p:cNvPr id="4" name="직사각형 3"/>
+          <p:cNvSpPr/>
+          <p:nvPr/>
+        </p:nvSpPr>
+        <p:spPr>
+          <a:xfrm>
+            <a:off x="481495" y="1289878"/>
+            <a:ext cx="2274957" cy="693530"/>
+          </a:xfrm>
+          <a:prstGeom prst="rect">
+            <a:avLst/>
+          </a:prstGeom>
+        </p:spPr>
+        <p:style>
+          <a:lnRef idx="2">
+            <a:schemeClr val="accent1">
+              <a:shade val="50000"/>
+            </a:schemeClr>
+          </a:lnRef>
+          <a:fillRef idx="1">
+            <a:schemeClr val="accent1"/>
+          </a:fillRef>
+          <a:effectRef idx="0">
+            <a:schemeClr val="accent1"/>
+          </a:effectRef>
+          <a:fontRef idx="minor">
+            <a:schemeClr val="lt1"/>
+          </a:fontRef>
+        </p:style>
+        <p:txBody>
+          <a:bodyPr rtlCol="0" anchor="ctr"/>
+          <a:lstStyle/>
+          <a:p>
+            <a:pPr algn="ctr"/>
+            <a:r>
+              <a:rPr lang="en-US" altLang="ko-KR" dirty="0" smtClean="0"/>
+              <a:t>FPN </a:t>
+            </a:r>
+            <a:r>
+              <a:rPr lang="ko-KR" altLang="en-US" dirty="0" smtClean="0"/>
+              <a:t>사용 </a:t>
+            </a:r>
+            <a:r>
+              <a:rPr lang="en-US" altLang="ko-KR" dirty="0" smtClean="0"/>
+              <a:t>X</a:t>
+            </a:r>
+            <a:endParaRPr lang="ko-KR" altLang="en-US" dirty="0"/>
+          </a:p>
+        </p:txBody>
+      </p:sp>
+      <p:sp>
+        <p:nvSpPr>
+          <p:cNvPr id="5" name="직사각형 4"/>
+          <p:cNvSpPr/>
+          <p:nvPr/>
+        </p:nvSpPr>
+        <p:spPr>
+          <a:xfrm>
+            <a:off x="481495" y="2449444"/>
+            <a:ext cx="2274957" cy="693530"/>
+          </a:xfrm>
+          <a:prstGeom prst="rect">
+            <a:avLst/>
+          </a:prstGeom>
+        </p:spPr>
+        <p:style>
+          <a:lnRef idx="2">
+            <a:schemeClr val="accent1">
+              <a:shade val="50000"/>
+            </a:schemeClr>
+          </a:lnRef>
+          <a:fillRef idx="1">
+            <a:schemeClr val="accent1"/>
+          </a:fillRef>
+          <a:effectRef idx="0">
+            <a:schemeClr val="accent1"/>
+          </a:effectRef>
+          <a:fontRef idx="minor">
+            <a:schemeClr val="lt1"/>
+          </a:fontRef>
+        </p:style>
+        <p:txBody>
+          <a:bodyPr rtlCol="0" anchor="ctr"/>
+          <a:lstStyle/>
+          <a:p>
+            <a:pPr algn="ctr"/>
+            <a:r>
               <a:rPr lang="en-US" altLang="ko-KR" dirty="0" smtClean="0"/>
               <a:t>FPN </a:t>
             </a:r>
@@ -3612,6 +3817,348 @@
     <p:extLst>
       <p:ext uri="{BB962C8B-B14F-4D97-AF65-F5344CB8AC3E}">
         <p14:creationId xmlns:p14="http://schemas.microsoft.com/office/powerpoint/2010/main" val="3605595765"/>
+      </p:ext>
+    </p:extLst>
+  </p:cSld>
+  <p:clrMapOvr>
+    <a:masterClrMapping/>
+  </p:clrMapOvr>
+</p:sld>
+</file>
+
+<file path=ppt/slides/slide4.xml><?xml version="1.0" encoding="utf-8"?>
+<p:sld xmlns:a="http://schemas.openxmlformats.org/drawingml/2006/main" xmlns:r="http://schemas.openxmlformats.org/officeDocument/2006/relationships" xmlns:p="http://schemas.openxmlformats.org/presentationml/2006/main">
+  <p:cSld>
+    <p:spTree>
+      <p:nvGrpSpPr>
+        <p:cNvPr id="1" name=""/>
+        <p:cNvGrpSpPr/>
+        <p:nvPr/>
+      </p:nvGrpSpPr>
+      <p:grpSpPr>
+        <a:xfrm>
+          <a:off x="0" y="0"/>
+          <a:ext cx="0" cy="0"/>
+          <a:chOff x="0" y="0"/>
+          <a:chExt cx="0" cy="0"/>
+        </a:xfrm>
+      </p:grpSpPr>
+      <p:sp>
+        <p:nvSpPr>
+          <p:cNvPr id="4" name="직사각형 3"/>
+          <p:cNvSpPr/>
+          <p:nvPr/>
+        </p:nvSpPr>
+        <p:spPr>
+          <a:xfrm>
+            <a:off x="2292626" y="781878"/>
+            <a:ext cx="1705113" cy="1042505"/>
+          </a:xfrm>
+          <a:prstGeom prst="rect">
+            <a:avLst/>
+          </a:prstGeom>
+        </p:spPr>
+        <p:style>
+          <a:lnRef idx="2">
+            <a:schemeClr val="accent1">
+              <a:shade val="50000"/>
+            </a:schemeClr>
+          </a:lnRef>
+          <a:fillRef idx="1">
+            <a:schemeClr val="accent1"/>
+          </a:fillRef>
+          <a:effectRef idx="0">
+            <a:schemeClr val="accent1"/>
+          </a:effectRef>
+          <a:fontRef idx="minor">
+            <a:schemeClr val="lt1"/>
+          </a:fontRef>
+        </p:style>
+        <p:txBody>
+          <a:bodyPr rtlCol="0" anchor="ctr"/>
+          <a:lstStyle/>
+          <a:p>
+            <a:pPr algn="ctr"/>
+            <a:r>
+              <a:rPr lang="ko-KR" altLang="en-US" dirty="0" smtClean="0"/>
+              <a:t>전체 크기의 </a:t>
+            </a:r>
+            <a:r>
+              <a:rPr lang="en-US" altLang="ko-KR" dirty="0" smtClean="0"/>
+              <a:t>1/64</a:t>
+            </a:r>
+            <a:r>
+              <a:rPr lang="ko-KR" altLang="en-US" dirty="0" smtClean="0"/>
+              <a:t>는 </a:t>
+            </a:r>
+            <a:r>
+              <a:rPr lang="ko-KR" altLang="en-US" dirty="0" err="1" smtClean="0"/>
+              <a:t>되야한다는</a:t>
+            </a:r>
+            <a:r>
+              <a:rPr lang="ko-KR" altLang="en-US" dirty="0" smtClean="0"/>
+              <a:t> 건데</a:t>
+            </a:r>
+            <a:endParaRPr lang="ko-KR" altLang="en-US" dirty="0"/>
+          </a:p>
+        </p:txBody>
+      </p:sp>
+      <p:sp>
+        <p:nvSpPr>
+          <p:cNvPr id="5" name="직사각형 4"/>
+          <p:cNvSpPr/>
+          <p:nvPr/>
+        </p:nvSpPr>
+        <p:spPr>
+          <a:xfrm>
+            <a:off x="2292626" y="2215322"/>
+            <a:ext cx="1705113" cy="1042505"/>
+          </a:xfrm>
+          <a:prstGeom prst="rect">
+            <a:avLst/>
+          </a:prstGeom>
+        </p:spPr>
+        <p:style>
+          <a:lnRef idx="2">
+            <a:schemeClr val="accent1">
+              <a:shade val="50000"/>
+            </a:schemeClr>
+          </a:lnRef>
+          <a:fillRef idx="1">
+            <a:schemeClr val="accent1"/>
+          </a:fillRef>
+          <a:effectRef idx="0">
+            <a:schemeClr val="accent1"/>
+          </a:effectRef>
+          <a:fontRef idx="minor">
+            <a:schemeClr val="lt1"/>
+          </a:fontRef>
+        </p:style>
+        <p:txBody>
+          <a:bodyPr rtlCol="0" anchor="ctr"/>
+          <a:lstStyle/>
+          <a:p>
+            <a:pPr algn="ctr"/>
+            <a:r>
+              <a:rPr lang="ko-KR" altLang="en-US" dirty="0" smtClean="0"/>
+              <a:t>실제 크기는</a:t>
+            </a:r>
+            <a:endParaRPr lang="en-US" altLang="ko-KR" dirty="0" smtClean="0"/>
+          </a:p>
+          <a:p>
+            <a:pPr algn="ctr"/>
+            <a:r>
+              <a:rPr lang="ko-KR" altLang="en-US" dirty="0" smtClean="0"/>
+              <a:t>못해도 </a:t>
+            </a:r>
+            <a:r>
+              <a:rPr lang="en-US" altLang="ko-KR" dirty="0" smtClean="0"/>
+              <a:t>1/800</a:t>
+            </a:r>
+            <a:r>
+              <a:rPr lang="ko-KR" altLang="en-US" dirty="0" smtClean="0"/>
+              <a:t>은 </a:t>
+            </a:r>
+            <a:r>
+              <a:rPr lang="ko-KR" altLang="en-US" dirty="0" err="1" smtClean="0"/>
+              <a:t>되야할</a:t>
+            </a:r>
+            <a:r>
+              <a:rPr lang="ko-KR" altLang="en-US" dirty="0" smtClean="0"/>
+              <a:t> 듯</a:t>
+            </a:r>
+            <a:endParaRPr lang="ko-KR" altLang="en-US" dirty="0"/>
+          </a:p>
+        </p:txBody>
+      </p:sp>
+      <p:sp>
+        <p:nvSpPr>
+          <p:cNvPr id="6" name="직사각형 5"/>
+          <p:cNvSpPr/>
+          <p:nvPr/>
+        </p:nvSpPr>
+        <p:spPr>
+          <a:xfrm>
+            <a:off x="2292626" y="3684104"/>
+            <a:ext cx="1705113" cy="1042505"/>
+          </a:xfrm>
+          <a:prstGeom prst="rect">
+            <a:avLst/>
+          </a:prstGeom>
+        </p:spPr>
+        <p:style>
+          <a:lnRef idx="2">
+            <a:schemeClr val="accent1">
+              <a:shade val="50000"/>
+            </a:schemeClr>
+          </a:lnRef>
+          <a:fillRef idx="1">
+            <a:schemeClr val="accent1"/>
+          </a:fillRef>
+          <a:effectRef idx="0">
+            <a:schemeClr val="accent1"/>
+          </a:effectRef>
+          <a:fontRef idx="minor">
+            <a:schemeClr val="lt1"/>
+          </a:fontRef>
+        </p:style>
+        <p:txBody>
+          <a:bodyPr rtlCol="0" anchor="ctr"/>
+          <a:lstStyle/>
+          <a:p>
+            <a:pPr algn="ctr"/>
+            <a:r>
+              <a:rPr lang="ko-KR" altLang="en-US" dirty="0" smtClean="0"/>
+              <a:t>즉</a:t>
+            </a:r>
+            <a:r>
+              <a:rPr lang="en-US" altLang="ko-KR" dirty="0" smtClean="0"/>
+              <a:t>, </a:t>
+            </a:r>
+            <a:r>
+              <a:rPr lang="ko-KR" altLang="en-US" dirty="0" err="1" smtClean="0"/>
+              <a:t>피처맵이</a:t>
+            </a:r>
+            <a:r>
+              <a:rPr lang="ko-KR" altLang="en-US" dirty="0" smtClean="0"/>
+              <a:t> </a:t>
+            </a:r>
+            <a:r>
+              <a:rPr lang="en-US" altLang="ko-KR" dirty="0" smtClean="0"/>
+              <a:t>30x30 </a:t>
+            </a:r>
+            <a:r>
+              <a:rPr lang="ko-KR" altLang="en-US" dirty="0" smtClean="0"/>
+              <a:t>이상이어야 한다는 것</a:t>
+            </a:r>
+            <a:endParaRPr lang="ko-KR" altLang="en-US" dirty="0"/>
+          </a:p>
+        </p:txBody>
+      </p:sp>
+      <p:sp>
+        <p:nvSpPr>
+          <p:cNvPr id="7" name="TextBox 6"/>
+          <p:cNvSpPr txBox="1"/>
+          <p:nvPr/>
+        </p:nvSpPr>
+        <p:spPr>
+          <a:xfrm>
+            <a:off x="5451061" y="1939235"/>
+            <a:ext cx="4969565" cy="369332"/>
+          </a:xfrm>
+          <a:prstGeom prst="rect">
+            <a:avLst/>
+          </a:prstGeom>
+          <a:noFill/>
+        </p:spPr>
+        <p:txBody>
+          <a:bodyPr wrap="square" rtlCol="0">
+            <a:spAutoFit/>
+          </a:bodyPr>
+          <a:lstStyle/>
+          <a:p>
+            <a:r>
+              <a:rPr lang="en-US" altLang="ko-KR" dirty="0" smtClean="0"/>
+              <a:t>(5, 4, anchor, channel, height, width)</a:t>
+            </a:r>
+            <a:endParaRPr lang="ko-KR" altLang="en-US" dirty="0"/>
+          </a:p>
+        </p:txBody>
+      </p:sp>
+      <p:sp>
+        <p:nvSpPr>
+          <p:cNvPr id="8" name="TextBox 7"/>
+          <p:cNvSpPr txBox="1"/>
+          <p:nvPr/>
+        </p:nvSpPr>
+        <p:spPr>
+          <a:xfrm>
+            <a:off x="5451061" y="3646557"/>
+            <a:ext cx="4969565" cy="369332"/>
+          </a:xfrm>
+          <a:prstGeom prst="rect">
+            <a:avLst/>
+          </a:prstGeom>
+          <a:noFill/>
+        </p:spPr>
+        <p:txBody>
+          <a:bodyPr wrap="square" rtlCol="0">
+            <a:spAutoFit/>
+          </a:bodyPr>
+          <a:lstStyle/>
+          <a:p>
+            <a:r>
+              <a:rPr lang="en-US" altLang="ko-KR" dirty="0" smtClean="0"/>
+              <a:t>(pyramid, </a:t>
+            </a:r>
+            <a:r>
+              <a:rPr lang="en-US" altLang="ko-KR" dirty="0" err="1" smtClean="0"/>
+              <a:t>img</a:t>
+            </a:r>
+            <a:r>
+              <a:rPr lang="en-US" altLang="ko-KR" dirty="0" smtClean="0"/>
+              <a:t>, channel, height, width)</a:t>
+            </a:r>
+            <a:endParaRPr lang="ko-KR" altLang="en-US" dirty="0"/>
+          </a:p>
+        </p:txBody>
+      </p:sp>
+      <p:sp>
+        <p:nvSpPr>
+          <p:cNvPr id="9" name="TextBox 8"/>
+          <p:cNvSpPr txBox="1"/>
+          <p:nvPr/>
+        </p:nvSpPr>
+        <p:spPr>
+          <a:xfrm>
+            <a:off x="5451061" y="2608230"/>
+            <a:ext cx="4969565" cy="646331"/>
+          </a:xfrm>
+          <a:prstGeom prst="rect">
+            <a:avLst/>
+          </a:prstGeom>
+          <a:noFill/>
+        </p:spPr>
+        <p:txBody>
+          <a:bodyPr wrap="square" rtlCol="0">
+            <a:spAutoFit/>
+          </a:bodyPr>
+          <a:lstStyle/>
+          <a:p>
+            <a:r>
+              <a:rPr lang="en-US" altLang="ko-KR" dirty="0" smtClean="0"/>
+              <a:t>(pyramid, </a:t>
+            </a:r>
+            <a:r>
+              <a:rPr lang="en-US" altLang="ko-KR" dirty="0" err="1" smtClean="0"/>
+              <a:t>img</a:t>
+            </a:r>
+            <a:r>
+              <a:rPr lang="en-US" altLang="ko-KR" dirty="0" smtClean="0"/>
+              <a:t>, anchor, channel, height, width)</a:t>
+            </a:r>
+          </a:p>
+          <a:p>
+            <a:r>
+              <a:rPr lang="ko-KR" altLang="en-US" dirty="0" smtClean="0"/>
+              <a:t>차원이 같아야 하나의 </a:t>
+            </a:r>
+            <a:r>
+              <a:rPr lang="en-US" altLang="ko-KR" dirty="0" smtClean="0"/>
+              <a:t>Tensor</a:t>
+            </a:r>
+            <a:r>
+              <a:rPr lang="ko-KR" altLang="en-US" dirty="0" smtClean="0"/>
+              <a:t>로 사용 가능</a:t>
+            </a:r>
+            <a:endParaRPr lang="ko-KR" altLang="en-US" dirty="0"/>
+          </a:p>
+        </p:txBody>
+      </p:sp>
+    </p:spTree>
+    <p:extLst>
+      <p:ext uri="{BB962C8B-B14F-4D97-AF65-F5344CB8AC3E}">
+        <p14:creationId xmlns:p14="http://schemas.microsoft.com/office/powerpoint/2010/main" val="82660779"/>
       </p:ext>
     </p:extLst>
   </p:cSld>

</xml_diff>